<commit_message>
make bounday case analysis in l04 consistent w/ l05
</commit_message>
<xml_diff>
--- a/instructor/l04/l04-pad.pptx
+++ b/instructor/l04/l04-pad.pptx
@@ -5,7 +5,7 @@
     <p:sldMasterId id="2147483648" r:id="rId1"/>
   </p:sldMasterIdLst>
   <p:notesMasterIdLst>
-    <p:notesMasterId r:id="rId20"/>
+    <p:notesMasterId r:id="rId21"/>
   </p:notesMasterIdLst>
   <p:sldIdLst>
     <p:sldId id="263" r:id="rId2"/>
@@ -23,9 +23,10 @@
     <p:sldId id="258" r:id="rId14"/>
     <p:sldId id="259" r:id="rId15"/>
     <p:sldId id="273" r:id="rId16"/>
-    <p:sldId id="262" r:id="rId17"/>
-    <p:sldId id="265" r:id="rId18"/>
-    <p:sldId id="266" r:id="rId19"/>
+    <p:sldId id="275" r:id="rId17"/>
+    <p:sldId id="276" r:id="rId18"/>
+    <p:sldId id="265" r:id="rId19"/>
+    <p:sldId id="266" r:id="rId20"/>
   </p:sldIdLst>
   <p:sldSz cx="12192000" cy="6858000"/>
   <p:notesSz cx="6858000" cy="9144000"/>
@@ -214,7 +215,7 @@
           <a:p>
             <a:fld id="{87B54243-B27E-4444-AFFD-D625E8407423}" type="datetimeFigureOut">
               <a:rPr lang="en-US" smtClean="0"/>
-              <a:t>9/21/23</a:t>
+              <a:t>9/16/24</a:t>
             </a:fld>
             <a:endParaRPr lang="en-US"/>
           </a:p>
@@ -733,6 +734,114 @@
 </p:notes>
 </file>
 
+<file path=ppt/notesSlides/notesSlide4.xml><?xml version="1.0" encoding="utf-8"?>
+<p:notes xmlns:a="http://schemas.openxmlformats.org/drawingml/2006/main" xmlns:r="http://schemas.openxmlformats.org/officeDocument/2006/relationships" xmlns:p="http://schemas.openxmlformats.org/presentationml/2006/main">
+  <p:cSld>
+    <p:spTree>
+      <p:nvGrpSpPr>
+        <p:cNvPr id="1" name="">
+          <a:extLst>
+            <a:ext uri="{FF2B5EF4-FFF2-40B4-BE49-F238E27FC236}">
+              <a16:creationId xmlns:a16="http://schemas.microsoft.com/office/drawing/2014/main" id="{3316D3B3-BA85-B8AF-D2A6-4C72AE288F71}"/>
+            </a:ext>
+          </a:extLst>
+        </p:cNvPr>
+        <p:cNvGrpSpPr/>
+        <p:nvPr/>
+      </p:nvGrpSpPr>
+      <p:grpSpPr>
+        <a:xfrm>
+          <a:off x="0" y="0"/>
+          <a:ext cx="0" cy="0"/>
+          <a:chOff x="0" y="0"/>
+          <a:chExt cx="0" cy="0"/>
+        </a:xfrm>
+      </p:grpSpPr>
+      <p:sp>
+        <p:nvSpPr>
+          <p:cNvPr id="2" name="Slide Image Placeholder 1">
+            <a:extLst>
+              <a:ext uri="{FF2B5EF4-FFF2-40B4-BE49-F238E27FC236}">
+                <a16:creationId xmlns:a16="http://schemas.microsoft.com/office/drawing/2014/main" id="{4485E0D2-3FDA-6B1F-6E6C-CE1FE2E1B52B}"/>
+              </a:ext>
+            </a:extLst>
+          </p:cNvPr>
+          <p:cNvSpPr>
+            <a:spLocks noGrp="1" noRot="1" noChangeAspect="1"/>
+          </p:cNvSpPr>
+          <p:nvPr>
+            <p:ph type="sldImg"/>
+          </p:nvPr>
+        </p:nvSpPr>
+        <p:spPr/>
+      </p:sp>
+      <p:sp>
+        <p:nvSpPr>
+          <p:cNvPr id="3" name="Notes Placeholder 2">
+            <a:extLst>
+              <a:ext uri="{FF2B5EF4-FFF2-40B4-BE49-F238E27FC236}">
+                <a16:creationId xmlns:a16="http://schemas.microsoft.com/office/drawing/2014/main" id="{4E5A6842-451B-868F-8751-FF8FDCEB04DF}"/>
+              </a:ext>
+            </a:extLst>
+          </p:cNvPr>
+          <p:cNvSpPr>
+            <a:spLocks noGrp="1"/>
+          </p:cNvSpPr>
+          <p:nvPr>
+            <p:ph type="body" idx="1"/>
+          </p:nvPr>
+        </p:nvSpPr>
+        <p:spPr/>
+        <p:txBody>
+          <a:bodyPr/>
+          <a:lstStyle/>
+          <a:p>
+            <a:endParaRPr lang="en-US" dirty="0"/>
+          </a:p>
+        </p:txBody>
+      </p:sp>
+      <p:sp>
+        <p:nvSpPr>
+          <p:cNvPr id="4" name="Slide Number Placeholder 3">
+            <a:extLst>
+              <a:ext uri="{FF2B5EF4-FFF2-40B4-BE49-F238E27FC236}">
+                <a16:creationId xmlns:a16="http://schemas.microsoft.com/office/drawing/2014/main" id="{784BE431-F40B-6D09-80F6-7D4B4E1F0AD9}"/>
+              </a:ext>
+            </a:extLst>
+          </p:cNvPr>
+          <p:cNvSpPr>
+            <a:spLocks noGrp="1"/>
+          </p:cNvSpPr>
+          <p:nvPr>
+            <p:ph type="sldNum" sz="quarter" idx="5"/>
+          </p:nvPr>
+        </p:nvSpPr>
+        <p:spPr/>
+        <p:txBody>
+          <a:bodyPr/>
+          <a:lstStyle/>
+          <a:p>
+            <a:fld id="{BFF143C5-0C31-7047-A641-CEA71AB77CA2}" type="slidenum">
+              <a:rPr lang="en-US" smtClean="0"/>
+              <a:t>17</a:t>
+            </a:fld>
+            <a:endParaRPr lang="en-US"/>
+          </a:p>
+        </p:txBody>
+      </p:sp>
+    </p:spTree>
+    <p:extLst>
+      <p:ext uri="{BB962C8B-B14F-4D97-AF65-F5344CB8AC3E}">
+        <p14:creationId xmlns:p14="http://schemas.microsoft.com/office/powerpoint/2010/main" val="2956204061"/>
+      </p:ext>
+    </p:extLst>
+  </p:cSld>
+  <p:clrMapOvr>
+    <a:masterClrMapping/>
+  </p:clrMapOvr>
+</p:notes>
+</file>
+
 <file path=ppt/slideLayouts/slideLayout1.xml><?xml version="1.0" encoding="utf-8"?>
 <p:sldLayout xmlns:a="http://schemas.openxmlformats.org/drawingml/2006/main" xmlns:r="http://schemas.openxmlformats.org/officeDocument/2006/relationships" xmlns:p="http://schemas.openxmlformats.org/presentationml/2006/main" type="title" preserve="1">
   <p:cSld name="Title Slide">
@@ -880,7 +989,7 @@
           <a:p>
             <a:fld id="{7282568E-B2CD-CD42-9C3E-5F238F3D4570}" type="datetimeFigureOut">
               <a:rPr lang="en-US" smtClean="0"/>
-              <a:t>9/21/23</a:t>
+              <a:t>9/16/24</a:t>
             </a:fld>
             <a:endParaRPr lang="en-US"/>
           </a:p>
@@ -1078,7 +1187,7 @@
           <a:p>
             <a:fld id="{7282568E-B2CD-CD42-9C3E-5F238F3D4570}" type="datetimeFigureOut">
               <a:rPr lang="en-US" smtClean="0"/>
-              <a:t>9/21/23</a:t>
+              <a:t>9/16/24</a:t>
             </a:fld>
             <a:endParaRPr lang="en-US"/>
           </a:p>
@@ -1286,7 +1395,7 @@
           <a:p>
             <a:fld id="{7282568E-B2CD-CD42-9C3E-5F238F3D4570}" type="datetimeFigureOut">
               <a:rPr lang="en-US" smtClean="0"/>
-              <a:t>9/21/23</a:t>
+              <a:t>9/16/24</a:t>
             </a:fld>
             <a:endParaRPr lang="en-US"/>
           </a:p>
@@ -1484,7 +1593,7 @@
           <a:p>
             <a:fld id="{7282568E-B2CD-CD42-9C3E-5F238F3D4570}" type="datetimeFigureOut">
               <a:rPr lang="en-US" smtClean="0"/>
-              <a:t>9/21/23</a:t>
+              <a:t>9/16/24</a:t>
             </a:fld>
             <a:endParaRPr lang="en-US"/>
           </a:p>
@@ -1759,7 +1868,7 @@
           <a:p>
             <a:fld id="{7282568E-B2CD-CD42-9C3E-5F238F3D4570}" type="datetimeFigureOut">
               <a:rPr lang="en-US" smtClean="0"/>
-              <a:t>9/21/23</a:t>
+              <a:t>9/16/24</a:t>
             </a:fld>
             <a:endParaRPr lang="en-US"/>
           </a:p>
@@ -2024,7 +2133,7 @@
           <a:p>
             <a:fld id="{7282568E-B2CD-CD42-9C3E-5F238F3D4570}" type="datetimeFigureOut">
               <a:rPr lang="en-US" smtClean="0"/>
-              <a:t>9/21/23</a:t>
+              <a:t>9/16/24</a:t>
             </a:fld>
             <a:endParaRPr lang="en-US"/>
           </a:p>
@@ -2436,7 +2545,7 @@
           <a:p>
             <a:fld id="{7282568E-B2CD-CD42-9C3E-5F238F3D4570}" type="datetimeFigureOut">
               <a:rPr lang="en-US" smtClean="0"/>
-              <a:t>9/21/23</a:t>
+              <a:t>9/16/24</a:t>
             </a:fld>
             <a:endParaRPr lang="en-US"/>
           </a:p>
@@ -2577,7 +2686,7 @@
           <a:p>
             <a:fld id="{7282568E-B2CD-CD42-9C3E-5F238F3D4570}" type="datetimeFigureOut">
               <a:rPr lang="en-US" smtClean="0"/>
-              <a:t>9/21/23</a:t>
+              <a:t>9/16/24</a:t>
             </a:fld>
             <a:endParaRPr lang="en-US"/>
           </a:p>
@@ -2690,7 +2799,7 @@
           <a:p>
             <a:fld id="{7282568E-B2CD-CD42-9C3E-5F238F3D4570}" type="datetimeFigureOut">
               <a:rPr lang="en-US" smtClean="0"/>
-              <a:t>9/21/23</a:t>
+              <a:t>9/16/24</a:t>
             </a:fld>
             <a:endParaRPr lang="en-US"/>
           </a:p>
@@ -3001,7 +3110,7 @@
           <a:p>
             <a:fld id="{7282568E-B2CD-CD42-9C3E-5F238F3D4570}" type="datetimeFigureOut">
               <a:rPr lang="en-US" smtClean="0"/>
-              <a:t>9/21/23</a:t>
+              <a:t>9/16/24</a:t>
             </a:fld>
             <a:endParaRPr lang="en-US"/>
           </a:p>
@@ -3289,7 +3398,7 @@
           <a:p>
             <a:fld id="{7282568E-B2CD-CD42-9C3E-5F238F3D4570}" type="datetimeFigureOut">
               <a:rPr lang="en-US" smtClean="0"/>
-              <a:t>9/21/23</a:t>
+              <a:t>9/16/24</a:t>
             </a:fld>
             <a:endParaRPr lang="en-US"/>
           </a:p>
@@ -3530,7 +3639,7 @@
           <a:p>
             <a:fld id="{7282568E-B2CD-CD42-9C3E-5F238F3D4570}" type="datetimeFigureOut">
               <a:rPr lang="en-US" smtClean="0"/>
-              <a:t>9/21/23</a:t>
+              <a:t>9/16/24</a:t>
             </a:fld>
             <a:endParaRPr lang="en-US"/>
           </a:p>
@@ -6907,42 +7016,481 @@
           <a:lstStyle/>
           <a:p>
             <a:r>
-              <a:rPr lang="en-CA" sz="3200" dirty="0">
-                <a:solidFill>
-                  <a:srgbClr val="FF0000"/>
-                </a:solidFill>
-              </a:rPr>
+              <a:rPr lang="en-CA" sz="3200" dirty="0"/>
               <a:t>BOT</a:t>
             </a:r>
             <a:br>
-              <a:rPr lang="en-CA" sz="3200" dirty="0">
-                <a:solidFill>
-                  <a:srgbClr val="FF0000"/>
-                </a:solidFill>
-              </a:rPr>
+              <a:rPr lang="en-CA" sz="3200" dirty="0"/>
             </a:br>
-            <a:r>
-              <a:rPr lang="en-CA" sz="3200" dirty="0">
-                <a:solidFill>
-                  <a:srgbClr val="FF0000"/>
-                </a:solidFill>
-              </a:rPr>
-              <a:t>HEIGHT</a:t>
-            </a:r>
-            <a:endParaRPr lang="en-US" sz="3200" dirty="0">
-              <a:solidFill>
-                <a:srgbClr val="FF0000"/>
-              </a:solidFill>
-            </a:endParaRPr>
+            <a:endParaRPr lang="en-US" sz="3200" dirty="0"/>
+          </a:p>
+        </p:txBody>
+      </p:sp>
+      <p:cxnSp>
+        <p:nvCxnSpPr>
+          <p:cNvPr id="34" name="Straight Connector 33">
+            <a:extLst>
+              <a:ext uri="{FF2B5EF4-FFF2-40B4-BE49-F238E27FC236}">
+                <a16:creationId xmlns:a16="http://schemas.microsoft.com/office/drawing/2014/main" id="{7F7CCF12-3AC2-2FEE-F697-3FC8A29BB714}"/>
+              </a:ext>
+            </a:extLst>
+          </p:cNvPr>
+          <p:cNvCxnSpPr>
+            <a:cxnSpLocks/>
+          </p:cNvCxnSpPr>
+          <p:nvPr/>
+        </p:nvCxnSpPr>
+        <p:spPr>
+          <a:xfrm>
+            <a:off x="2061302" y="6057151"/>
+            <a:ext cx="2075379" cy="0"/>
+          </a:xfrm>
+          <a:prstGeom prst="line">
+            <a:avLst/>
+          </a:prstGeom>
+          <a:ln w="28575"/>
+        </p:spPr>
+        <p:style>
+          <a:lnRef idx="1">
+            <a:schemeClr val="accent1"/>
+          </a:lnRef>
+          <a:fillRef idx="0">
+            <a:schemeClr val="accent1"/>
+          </a:fillRef>
+          <a:effectRef idx="0">
+            <a:schemeClr val="accent1"/>
+          </a:effectRef>
+          <a:fontRef idx="minor">
+            <a:schemeClr val="tx1"/>
+          </a:fontRef>
+        </p:style>
+      </p:cxnSp>
+      <p:cxnSp>
+        <p:nvCxnSpPr>
+          <p:cNvPr id="35" name="Straight Connector 34">
+            <a:extLst>
+              <a:ext uri="{FF2B5EF4-FFF2-40B4-BE49-F238E27FC236}">
+                <a16:creationId xmlns:a16="http://schemas.microsoft.com/office/drawing/2014/main" id="{F2E66426-1CFD-359C-4D56-A893CE478591}"/>
+              </a:ext>
+            </a:extLst>
+          </p:cNvPr>
+          <p:cNvCxnSpPr>
+            <a:cxnSpLocks/>
+          </p:cNvCxnSpPr>
+          <p:nvPr/>
+        </p:nvCxnSpPr>
+        <p:spPr>
+          <a:xfrm>
+            <a:off x="2071576" y="4777162"/>
+            <a:ext cx="2065105" cy="0"/>
+          </a:xfrm>
+          <a:prstGeom prst="line">
+            <a:avLst/>
+          </a:prstGeom>
+          <a:ln w="28575">
+            <a:prstDash val="dash"/>
+          </a:ln>
+        </p:spPr>
+        <p:style>
+          <a:lnRef idx="1">
+            <a:schemeClr val="accent1"/>
+          </a:lnRef>
+          <a:fillRef idx="0">
+            <a:schemeClr val="accent1"/>
+          </a:fillRef>
+          <a:effectRef idx="0">
+            <a:schemeClr val="accent1"/>
+          </a:effectRef>
+          <a:fontRef idx="minor">
+            <a:schemeClr val="tx1"/>
+          </a:fontRef>
+        </p:style>
+      </p:cxnSp>
+      <p:cxnSp>
+        <p:nvCxnSpPr>
+          <p:cNvPr id="32" name="Straight Connector 31">
+            <a:extLst>
+              <a:ext uri="{FF2B5EF4-FFF2-40B4-BE49-F238E27FC236}">
+                <a16:creationId xmlns:a16="http://schemas.microsoft.com/office/drawing/2014/main" id="{C306F018-41FF-F28F-F061-6B8541780A35}"/>
+              </a:ext>
+            </a:extLst>
+          </p:cNvPr>
+          <p:cNvCxnSpPr>
+            <a:cxnSpLocks/>
+          </p:cNvCxnSpPr>
+          <p:nvPr/>
+        </p:nvCxnSpPr>
+        <p:spPr>
+          <a:xfrm>
+            <a:off x="5767513" y="6057151"/>
+            <a:ext cx="2075379" cy="0"/>
+          </a:xfrm>
+          <a:prstGeom prst="line">
+            <a:avLst/>
+          </a:prstGeom>
+          <a:ln w="28575"/>
+        </p:spPr>
+        <p:style>
+          <a:lnRef idx="1">
+            <a:schemeClr val="accent1"/>
+          </a:lnRef>
+          <a:fillRef idx="0">
+            <a:schemeClr val="accent1"/>
+          </a:fillRef>
+          <a:effectRef idx="0">
+            <a:schemeClr val="accent1"/>
+          </a:effectRef>
+          <a:fontRef idx="minor">
+            <a:schemeClr val="tx1"/>
+          </a:fontRef>
+        </p:style>
+      </p:cxnSp>
+      <p:cxnSp>
+        <p:nvCxnSpPr>
+          <p:cNvPr id="33" name="Straight Connector 32">
+            <a:extLst>
+              <a:ext uri="{FF2B5EF4-FFF2-40B4-BE49-F238E27FC236}">
+                <a16:creationId xmlns:a16="http://schemas.microsoft.com/office/drawing/2014/main" id="{C10606F2-B4CF-5DAC-3CBA-8F7C95116678}"/>
+              </a:ext>
+            </a:extLst>
+          </p:cNvPr>
+          <p:cNvCxnSpPr>
+            <a:cxnSpLocks/>
+          </p:cNvCxnSpPr>
+          <p:nvPr/>
+        </p:nvCxnSpPr>
+        <p:spPr>
+          <a:xfrm>
+            <a:off x="5777787" y="4777162"/>
+            <a:ext cx="2065105" cy="0"/>
+          </a:xfrm>
+          <a:prstGeom prst="line">
+            <a:avLst/>
+          </a:prstGeom>
+          <a:ln w="28575">
+            <a:prstDash val="dash"/>
+          </a:ln>
+        </p:spPr>
+        <p:style>
+          <a:lnRef idx="1">
+            <a:schemeClr val="accent1"/>
+          </a:lnRef>
+          <a:fillRef idx="0">
+            <a:schemeClr val="accent1"/>
+          </a:fillRef>
+          <a:effectRef idx="0">
+            <a:schemeClr val="accent1"/>
+          </a:effectRef>
+          <a:fontRef idx="minor">
+            <a:schemeClr val="tx1"/>
+          </a:fontRef>
+        </p:style>
+      </p:cxnSp>
+      <p:cxnSp>
+        <p:nvCxnSpPr>
+          <p:cNvPr id="30" name="Straight Connector 29">
+            <a:extLst>
+              <a:ext uri="{FF2B5EF4-FFF2-40B4-BE49-F238E27FC236}">
+                <a16:creationId xmlns:a16="http://schemas.microsoft.com/office/drawing/2014/main" id="{469FF150-8B69-9D29-9EDD-57EE61B9DCC6}"/>
+              </a:ext>
+            </a:extLst>
+          </p:cNvPr>
+          <p:cNvCxnSpPr>
+            <a:cxnSpLocks/>
+          </p:cNvCxnSpPr>
+          <p:nvPr/>
+        </p:nvCxnSpPr>
+        <p:spPr>
+          <a:xfrm>
+            <a:off x="9473723" y="6040565"/>
+            <a:ext cx="2075379" cy="0"/>
+          </a:xfrm>
+          <a:prstGeom prst="line">
+            <a:avLst/>
+          </a:prstGeom>
+          <a:ln w="28575"/>
+        </p:spPr>
+        <p:style>
+          <a:lnRef idx="1">
+            <a:schemeClr val="accent1"/>
+          </a:lnRef>
+          <a:fillRef idx="0">
+            <a:schemeClr val="accent1"/>
+          </a:fillRef>
+          <a:effectRef idx="0">
+            <a:schemeClr val="accent1"/>
+          </a:effectRef>
+          <a:fontRef idx="minor">
+            <a:schemeClr val="tx1"/>
+          </a:fontRef>
+        </p:style>
+      </p:cxnSp>
+      <p:cxnSp>
+        <p:nvCxnSpPr>
+          <p:cNvPr id="31" name="Straight Connector 30">
+            <a:extLst>
+              <a:ext uri="{FF2B5EF4-FFF2-40B4-BE49-F238E27FC236}">
+                <a16:creationId xmlns:a16="http://schemas.microsoft.com/office/drawing/2014/main" id="{9DFB1F3A-B48D-0E93-CBC0-7659B5A4EA7F}"/>
+              </a:ext>
+            </a:extLst>
+          </p:cNvPr>
+          <p:cNvCxnSpPr>
+            <a:cxnSpLocks/>
+          </p:cNvCxnSpPr>
+          <p:nvPr/>
+        </p:nvCxnSpPr>
+        <p:spPr>
+          <a:xfrm>
+            <a:off x="9483997" y="4760576"/>
+            <a:ext cx="2065105" cy="0"/>
+          </a:xfrm>
+          <a:prstGeom prst="line">
+            <a:avLst/>
+          </a:prstGeom>
+          <a:ln w="28575">
+            <a:prstDash val="dash"/>
+          </a:ln>
+        </p:spPr>
+        <p:style>
+          <a:lnRef idx="1">
+            <a:schemeClr val="accent1"/>
+          </a:lnRef>
+          <a:fillRef idx="0">
+            <a:schemeClr val="accent1"/>
+          </a:fillRef>
+          <a:effectRef idx="0">
+            <a:schemeClr val="accent1"/>
+          </a:effectRef>
+          <a:fontRef idx="minor">
+            <a:schemeClr val="tx1"/>
+          </a:fontRef>
+        </p:style>
+      </p:cxnSp>
+      <p:sp>
+        <p:nvSpPr>
+          <p:cNvPr id="17" name="TextBox 16">
+            <a:extLst>
+              <a:ext uri="{FF2B5EF4-FFF2-40B4-BE49-F238E27FC236}">
+                <a16:creationId xmlns:a16="http://schemas.microsoft.com/office/drawing/2014/main" id="{76D002BA-B1A6-23D2-A1C1-6B2E887FA1B5}"/>
+              </a:ext>
+            </a:extLst>
+          </p:cNvPr>
+          <p:cNvSpPr txBox="1"/>
+          <p:nvPr/>
+        </p:nvSpPr>
+        <p:spPr>
+          <a:xfrm>
+            <a:off x="2657914" y="400643"/>
+            <a:ext cx="7389494" cy="584775"/>
+          </a:xfrm>
+          <a:prstGeom prst="rect">
+            <a:avLst/>
+          </a:prstGeom>
+          <a:noFill/>
+        </p:spPr>
+        <p:txBody>
+          <a:bodyPr wrap="square" rtlCol="0">
+            <a:spAutoFit/>
+          </a:bodyPr>
+          <a:lstStyle/>
+          <a:p>
+            <a:pPr algn="ctr"/>
+            <a:r>
+              <a:rPr lang="en-US" sz="3200" dirty="0"/>
+              <a:t>boundary case analysis for tock</a:t>
+            </a:r>
+          </a:p>
+        </p:txBody>
+      </p:sp>
+      <p:sp>
+        <p:nvSpPr>
+          <p:cNvPr id="19" name="TextBox 18">
+            <a:extLst>
+              <a:ext uri="{FF2B5EF4-FFF2-40B4-BE49-F238E27FC236}">
+                <a16:creationId xmlns:a16="http://schemas.microsoft.com/office/drawing/2014/main" id="{C825C0B2-4FDC-1186-8236-0AFA04016644}"/>
+              </a:ext>
+            </a:extLst>
+          </p:cNvPr>
+          <p:cNvSpPr txBox="1"/>
+          <p:nvPr/>
+        </p:nvSpPr>
+        <p:spPr>
+          <a:xfrm>
+            <a:off x="2138356" y="6174944"/>
+            <a:ext cx="1921268" cy="369332"/>
+          </a:xfrm>
+          <a:prstGeom prst="rect">
+            <a:avLst/>
+          </a:prstGeom>
+          <a:noFill/>
+        </p:spPr>
+        <p:txBody>
+          <a:bodyPr wrap="square" rtlCol="0">
+            <a:spAutoFit/>
+          </a:bodyPr>
+          <a:lstStyle/>
+          <a:p>
+            <a:pPr algn="ctr"/>
+            <a:r>
+              <a:rPr lang="en-US" dirty="0"/>
+              <a:t>result is BOT - 1</a:t>
+            </a:r>
+          </a:p>
+        </p:txBody>
+      </p:sp>
+      <p:sp>
+        <p:nvSpPr>
+          <p:cNvPr id="21" name="TextBox 20">
+            <a:extLst>
+              <a:ext uri="{FF2B5EF4-FFF2-40B4-BE49-F238E27FC236}">
+                <a16:creationId xmlns:a16="http://schemas.microsoft.com/office/drawing/2014/main" id="{F985B649-1468-10A9-E193-DB5E051BCD45}"/>
+              </a:ext>
+            </a:extLst>
+          </p:cNvPr>
+          <p:cNvSpPr txBox="1"/>
+          <p:nvPr/>
+        </p:nvSpPr>
+        <p:spPr>
+          <a:xfrm>
+            <a:off x="5844568" y="6174944"/>
+            <a:ext cx="1921268" cy="369332"/>
+          </a:xfrm>
+          <a:prstGeom prst="rect">
+            <a:avLst/>
+          </a:prstGeom>
+          <a:noFill/>
+        </p:spPr>
+        <p:txBody>
+          <a:bodyPr wrap="square" rtlCol="0">
+            <a:spAutoFit/>
+          </a:bodyPr>
+          <a:lstStyle/>
+          <a:p>
+            <a:pPr algn="ctr"/>
+            <a:r>
+              <a:rPr lang="en-US" dirty="0"/>
+              <a:t>result is BOT</a:t>
+            </a:r>
+          </a:p>
+        </p:txBody>
+      </p:sp>
+      <p:sp>
+        <p:nvSpPr>
+          <p:cNvPr id="22" name="TextBox 21">
+            <a:extLst>
+              <a:ext uri="{FF2B5EF4-FFF2-40B4-BE49-F238E27FC236}">
+                <a16:creationId xmlns:a16="http://schemas.microsoft.com/office/drawing/2014/main" id="{2D5F951F-0ABF-EFEA-4F67-D5D1542860D3}"/>
+              </a:ext>
+            </a:extLst>
+          </p:cNvPr>
+          <p:cNvSpPr txBox="1"/>
+          <p:nvPr/>
+        </p:nvSpPr>
+        <p:spPr>
+          <a:xfrm>
+            <a:off x="9595106" y="6174944"/>
+            <a:ext cx="1921268" cy="369332"/>
+          </a:xfrm>
+          <a:prstGeom prst="rect">
+            <a:avLst/>
+          </a:prstGeom>
+          <a:noFill/>
+        </p:spPr>
+        <p:txBody>
+          <a:bodyPr wrap="square" rtlCol="0">
+            <a:spAutoFit/>
+          </a:bodyPr>
+          <a:lstStyle/>
+          <a:p>
+            <a:pPr algn="ctr"/>
+            <a:r>
+              <a:rPr lang="en-US" dirty="0"/>
+              <a:t>result is BOT</a:t>
+            </a:r>
+          </a:p>
+        </p:txBody>
+      </p:sp>
+    </p:spTree>
+    <p:extLst>
+      <p:ext uri="{BB962C8B-B14F-4D97-AF65-F5344CB8AC3E}">
+        <p14:creationId xmlns:p14="http://schemas.microsoft.com/office/powerpoint/2010/main" val="1214897466"/>
+      </p:ext>
+    </p:extLst>
+  </p:cSld>
+  <p:clrMapOvr>
+    <a:masterClrMapping/>
+  </p:clrMapOvr>
+</p:sld>
+</file>
+
+<file path=ppt/slides/slide17.xml><?xml version="1.0" encoding="utf-8"?>
+<p:sld xmlns:a="http://schemas.openxmlformats.org/drawingml/2006/main" xmlns:r="http://schemas.openxmlformats.org/officeDocument/2006/relationships" xmlns:p="http://schemas.openxmlformats.org/presentationml/2006/main">
+  <p:cSld>
+    <p:spTree>
+      <p:nvGrpSpPr>
+        <p:cNvPr id="1" name="">
+          <a:extLst>
+            <a:ext uri="{FF2B5EF4-FFF2-40B4-BE49-F238E27FC236}">
+              <a16:creationId xmlns:a16="http://schemas.microsoft.com/office/drawing/2014/main" id="{A41BC651-22FD-24AE-CA39-CFDDC62BE273}"/>
+            </a:ext>
+          </a:extLst>
+        </p:cNvPr>
+        <p:cNvGrpSpPr/>
+        <p:nvPr/>
+      </p:nvGrpSpPr>
+      <p:grpSpPr>
+        <a:xfrm>
+          <a:off x="0" y="0"/>
+          <a:ext cx="0" cy="0"/>
+          <a:chOff x="0" y="0"/>
+          <a:chExt cx="0" cy="0"/>
+        </a:xfrm>
+      </p:grpSpPr>
+      <p:sp>
+        <p:nvSpPr>
+          <p:cNvPr id="2" name="TextBox 1">
+            <a:extLst>
+              <a:ext uri="{FF2B5EF4-FFF2-40B4-BE49-F238E27FC236}">
+                <a16:creationId xmlns:a16="http://schemas.microsoft.com/office/drawing/2014/main" id="{9FC47AD6-81BD-5C5A-EBE2-0FA0DF6055FB}"/>
+              </a:ext>
+            </a:extLst>
+          </p:cNvPr>
+          <p:cNvSpPr txBox="1"/>
+          <p:nvPr/>
+        </p:nvSpPr>
+        <p:spPr>
+          <a:xfrm>
+            <a:off x="0" y="4492809"/>
+            <a:ext cx="3154167" cy="1077218"/>
+          </a:xfrm>
+          <a:prstGeom prst="rect">
+            <a:avLst/>
+          </a:prstGeom>
+          <a:noFill/>
+        </p:spPr>
+        <p:txBody>
+          <a:bodyPr wrap="square" rtlCol="0">
+            <a:spAutoFit/>
+          </a:bodyPr>
+          <a:lstStyle/>
+          <a:p>
+            <a:r>
+              <a:rPr lang="en-CA" sz="3200" dirty="0"/>
+              <a:t>BOT</a:t>
+            </a:r>
+            <a:br>
+              <a:rPr lang="en-CA" sz="3200" dirty="0"/>
+            </a:br>
+            <a:endParaRPr lang="en-US" sz="3200" dirty="0"/>
           </a:p>
         </p:txBody>
       </p:sp>
       <p:grpSp>
         <p:nvGrpSpPr>
-          <p:cNvPr id="39" name="Group 38">
-            <a:extLst>
-              <a:ext uri="{FF2B5EF4-FFF2-40B4-BE49-F238E27FC236}">
-                <a16:creationId xmlns:a16="http://schemas.microsoft.com/office/drawing/2014/main" id="{718BAA27-160F-D70D-4FEA-4F28BCE153B2}"/>
+          <p:cNvPr id="14" name="Group 13">
+            <a:extLst>
+              <a:ext uri="{FF2B5EF4-FFF2-40B4-BE49-F238E27FC236}">
+                <a16:creationId xmlns:a16="http://schemas.microsoft.com/office/drawing/2014/main" id="{19E067A2-4268-D5E8-B5CD-906D40218ECE}"/>
               </a:ext>
             </a:extLst>
           </p:cNvPr>
@@ -6951,18 +7499,18 @@
         </p:nvGrpSpPr>
         <p:grpSpPr>
           <a:xfrm>
-            <a:off x="9582934" y="4777162"/>
-            <a:ext cx="2075379" cy="519703"/>
-            <a:chOff x="9575515" y="4623050"/>
-            <a:chExt cx="2075379" cy="519703"/>
+            <a:off x="2061302" y="2541952"/>
+            <a:ext cx="2075379" cy="3515199"/>
+            <a:chOff x="1426391" y="2541952"/>
+            <a:chExt cx="2075379" cy="3515199"/>
           </a:xfrm>
         </p:grpSpPr>
         <p:cxnSp>
           <p:nvCxnSpPr>
-            <p:cNvPr id="18" name="Straight Connector 17">
+            <p:cNvPr id="34" name="Straight Connector 33">
               <a:extLst>
                 <a:ext uri="{FF2B5EF4-FFF2-40B4-BE49-F238E27FC236}">
-                  <a16:creationId xmlns:a16="http://schemas.microsoft.com/office/drawing/2014/main" id="{A07A9568-46EE-1DD1-3984-60D1C38A82C5}"/>
+                  <a16:creationId xmlns:a16="http://schemas.microsoft.com/office/drawing/2014/main" id="{3FFE56F6-9592-822D-08AD-CE6A034F31A2}"/>
                 </a:ext>
               </a:extLst>
             </p:cNvPr>
@@ -6973,7 +7521,7 @@
           </p:nvCxnSpPr>
           <p:spPr>
             <a:xfrm>
-              <a:off x="9575515" y="5142753"/>
+              <a:off x="1426391" y="6057151"/>
               <a:ext cx="2075379" cy="0"/>
             </a:xfrm>
             <a:prstGeom prst="line">
@@ -6998,10 +7546,10 @@
         </p:cxnSp>
         <p:cxnSp>
           <p:nvCxnSpPr>
-            <p:cNvPr id="20" name="Straight Connector 19">
+            <p:cNvPr id="35" name="Straight Connector 34">
               <a:extLst>
                 <a:ext uri="{FF2B5EF4-FFF2-40B4-BE49-F238E27FC236}">
-                  <a16:creationId xmlns:a16="http://schemas.microsoft.com/office/drawing/2014/main" id="{152DC5A3-7436-95A0-312C-608E298AFE6E}"/>
+                  <a16:creationId xmlns:a16="http://schemas.microsoft.com/office/drawing/2014/main" id="{FE174F6E-11BC-F3D3-81C3-C8F64C572A2F}"/>
                 </a:ext>
               </a:extLst>
             </p:cNvPr>
@@ -7012,7 +7560,7 @@
           </p:nvCxnSpPr>
           <p:spPr>
             <a:xfrm>
-              <a:off x="9585789" y="4623050"/>
+              <a:off x="1436665" y="4777162"/>
               <a:ext cx="2065105" cy="0"/>
             </a:xfrm>
             <a:prstGeom prst="line">
@@ -7037,13 +7585,100 @@
             </a:fontRef>
           </p:style>
         </p:cxnSp>
+        <p:sp>
+          <p:nvSpPr>
+            <p:cNvPr id="3" name="Oval 2">
+              <a:extLst>
+                <a:ext uri="{FF2B5EF4-FFF2-40B4-BE49-F238E27FC236}">
+                  <a16:creationId xmlns:a16="http://schemas.microsoft.com/office/drawing/2014/main" id="{F15D080B-5CB4-FB6F-8C68-CFEA8E935874}"/>
+                </a:ext>
+              </a:extLst>
+            </p:cNvPr>
+            <p:cNvSpPr/>
+            <p:nvPr/>
+          </p:nvSpPr>
+          <p:spPr>
+            <a:xfrm>
+              <a:off x="1947803" y="2541952"/>
+              <a:ext cx="1032553" cy="1032553"/>
+            </a:xfrm>
+            <a:prstGeom prst="ellipse">
+              <a:avLst/>
+            </a:prstGeom>
+            <a:noFill/>
+            <a:ln w="28575"/>
+          </p:spPr>
+          <p:style>
+            <a:lnRef idx="2">
+              <a:schemeClr val="accent1">
+                <a:shade val="50000"/>
+              </a:schemeClr>
+            </a:lnRef>
+            <a:fillRef idx="1">
+              <a:schemeClr val="accent1"/>
+            </a:fillRef>
+            <a:effectRef idx="0">
+              <a:schemeClr val="accent1"/>
+            </a:effectRef>
+            <a:fontRef idx="minor">
+              <a:schemeClr val="lt1"/>
+            </a:fontRef>
+          </p:style>
+          <p:txBody>
+            <a:bodyPr rtlCol="0" anchor="ctr"/>
+            <a:lstStyle/>
+            <a:p>
+              <a:pPr algn="ctr"/>
+              <a:endParaRPr lang="en-US"/>
+            </a:p>
+          </p:txBody>
+        </p:sp>
+        <p:cxnSp>
+          <p:nvCxnSpPr>
+            <p:cNvPr id="5" name="Straight Arrow Connector 4">
+              <a:extLst>
+                <a:ext uri="{FF2B5EF4-FFF2-40B4-BE49-F238E27FC236}">
+                  <a16:creationId xmlns:a16="http://schemas.microsoft.com/office/drawing/2014/main" id="{04B57B46-3609-5E9F-CE15-447831B8F924}"/>
+                </a:ext>
+              </a:extLst>
+            </p:cNvPr>
+            <p:cNvCxnSpPr/>
+            <p:nvPr/>
+          </p:nvCxnSpPr>
+          <p:spPr>
+            <a:xfrm>
+              <a:off x="2464079" y="3058228"/>
+              <a:ext cx="0" cy="1434581"/>
+            </a:xfrm>
+            <a:prstGeom prst="straightConnector1">
+              <a:avLst/>
+            </a:prstGeom>
+            <a:ln w="28575">
+              <a:tailEnd type="triangle"/>
+            </a:ln>
+          </p:spPr>
+          <p:style>
+            <a:lnRef idx="1">
+              <a:schemeClr val="accent1"/>
+            </a:lnRef>
+            <a:fillRef idx="0">
+              <a:schemeClr val="accent1"/>
+            </a:fillRef>
+            <a:effectRef idx="0">
+              <a:schemeClr val="accent1"/>
+            </a:effectRef>
+            <a:fontRef idx="minor">
+              <a:schemeClr val="tx1"/>
+            </a:fontRef>
+          </p:style>
+        </p:cxnSp>
       </p:grpSp>
       <p:grpSp>
         <p:nvGrpSpPr>
-          <p:cNvPr id="38" name="Group 37">
-            <a:extLst>
-              <a:ext uri="{FF2B5EF4-FFF2-40B4-BE49-F238E27FC236}">
-                <a16:creationId xmlns:a16="http://schemas.microsoft.com/office/drawing/2014/main" id="{D784C3CD-2B7B-0582-EABD-36D99C7BAF24}"/>
+          <p:cNvPr id="13" name="Group 12">
+            <a:extLst>
+              <a:ext uri="{FF2B5EF4-FFF2-40B4-BE49-F238E27FC236}">
+                <a16:creationId xmlns:a16="http://schemas.microsoft.com/office/drawing/2014/main" id="{455D9F61-9905-7F1B-9933-584F7488BE33}"/>
               </a:ext>
             </a:extLst>
           </p:cNvPr>
@@ -7052,18 +7687,18 @@
         </p:nvGrpSpPr>
         <p:grpSpPr>
           <a:xfrm>
-            <a:off x="6864087" y="4760576"/>
-            <a:ext cx="2075379" cy="519703"/>
-            <a:chOff x="6912796" y="4606464"/>
-            <a:chExt cx="2075379" cy="519703"/>
+            <a:off x="5767513" y="2827916"/>
+            <a:ext cx="2075379" cy="3229235"/>
+            <a:chOff x="4145239" y="2827916"/>
+            <a:chExt cx="2075379" cy="3229235"/>
           </a:xfrm>
         </p:grpSpPr>
         <p:cxnSp>
           <p:nvCxnSpPr>
-            <p:cNvPr id="30" name="Straight Connector 29">
+            <p:cNvPr id="32" name="Straight Connector 31">
               <a:extLst>
                 <a:ext uri="{FF2B5EF4-FFF2-40B4-BE49-F238E27FC236}">
-                  <a16:creationId xmlns:a16="http://schemas.microsoft.com/office/drawing/2014/main" id="{469FF150-8B69-9D29-9EDD-57EE61B9DCC6}"/>
+                  <a16:creationId xmlns:a16="http://schemas.microsoft.com/office/drawing/2014/main" id="{4B36393C-B71D-FC29-606A-C455F7866C7E}"/>
                 </a:ext>
               </a:extLst>
             </p:cNvPr>
@@ -7074,7 +7709,195 @@
           </p:nvCxnSpPr>
           <p:spPr>
             <a:xfrm>
-              <a:off x="6912796" y="5126167"/>
+              <a:off x="4145239" y="6057151"/>
+              <a:ext cx="2075379" cy="0"/>
+            </a:xfrm>
+            <a:prstGeom prst="line">
+              <a:avLst/>
+            </a:prstGeom>
+            <a:ln w="28575"/>
+          </p:spPr>
+          <p:style>
+            <a:lnRef idx="1">
+              <a:schemeClr val="accent1"/>
+            </a:lnRef>
+            <a:fillRef idx="0">
+              <a:schemeClr val="accent1"/>
+            </a:fillRef>
+            <a:effectRef idx="0">
+              <a:schemeClr val="accent1"/>
+            </a:effectRef>
+            <a:fontRef idx="minor">
+              <a:schemeClr val="tx1"/>
+            </a:fontRef>
+          </p:style>
+        </p:cxnSp>
+        <p:cxnSp>
+          <p:nvCxnSpPr>
+            <p:cNvPr id="33" name="Straight Connector 32">
+              <a:extLst>
+                <a:ext uri="{FF2B5EF4-FFF2-40B4-BE49-F238E27FC236}">
+                  <a16:creationId xmlns:a16="http://schemas.microsoft.com/office/drawing/2014/main" id="{1F830D83-3E87-3575-2C12-0F85289E7E08}"/>
+                </a:ext>
+              </a:extLst>
+            </p:cNvPr>
+            <p:cNvCxnSpPr>
+              <a:cxnSpLocks/>
+            </p:cNvCxnSpPr>
+            <p:nvPr/>
+          </p:nvCxnSpPr>
+          <p:spPr>
+            <a:xfrm>
+              <a:off x="4155513" y="4777162"/>
+              <a:ext cx="2065105" cy="0"/>
+            </a:xfrm>
+            <a:prstGeom prst="line">
+              <a:avLst/>
+            </a:prstGeom>
+            <a:ln w="28575">
+              <a:prstDash val="dash"/>
+            </a:ln>
+          </p:spPr>
+          <p:style>
+            <a:lnRef idx="1">
+              <a:schemeClr val="accent1"/>
+            </a:lnRef>
+            <a:fillRef idx="0">
+              <a:schemeClr val="accent1"/>
+            </a:fillRef>
+            <a:effectRef idx="0">
+              <a:schemeClr val="accent1"/>
+            </a:effectRef>
+            <a:fontRef idx="minor">
+              <a:schemeClr val="tx1"/>
+            </a:fontRef>
+          </p:style>
+        </p:cxnSp>
+        <p:sp>
+          <p:nvSpPr>
+            <p:cNvPr id="6" name="Oval 5">
+              <a:extLst>
+                <a:ext uri="{FF2B5EF4-FFF2-40B4-BE49-F238E27FC236}">
+                  <a16:creationId xmlns:a16="http://schemas.microsoft.com/office/drawing/2014/main" id="{33A18A05-FE77-F5AC-EB8F-D1CB8B57451E}"/>
+                </a:ext>
+              </a:extLst>
+            </p:cNvPr>
+            <p:cNvSpPr/>
+            <p:nvPr/>
+          </p:nvSpPr>
+          <p:spPr>
+            <a:xfrm>
+              <a:off x="4730387" y="2827916"/>
+              <a:ext cx="1032553" cy="1032553"/>
+            </a:xfrm>
+            <a:prstGeom prst="ellipse">
+              <a:avLst/>
+            </a:prstGeom>
+            <a:noFill/>
+            <a:ln w="28575"/>
+          </p:spPr>
+          <p:style>
+            <a:lnRef idx="2">
+              <a:schemeClr val="accent1">
+                <a:shade val="50000"/>
+              </a:schemeClr>
+            </a:lnRef>
+            <a:fillRef idx="1">
+              <a:schemeClr val="accent1"/>
+            </a:fillRef>
+            <a:effectRef idx="0">
+              <a:schemeClr val="accent1"/>
+            </a:effectRef>
+            <a:fontRef idx="minor">
+              <a:schemeClr val="lt1"/>
+            </a:fontRef>
+          </p:style>
+          <p:txBody>
+            <a:bodyPr rtlCol="0" anchor="ctr"/>
+            <a:lstStyle/>
+            <a:p>
+              <a:pPr algn="ctr"/>
+              <a:endParaRPr lang="en-US"/>
+            </a:p>
+          </p:txBody>
+        </p:sp>
+        <p:cxnSp>
+          <p:nvCxnSpPr>
+            <p:cNvPr id="7" name="Straight Arrow Connector 6">
+              <a:extLst>
+                <a:ext uri="{FF2B5EF4-FFF2-40B4-BE49-F238E27FC236}">
+                  <a16:creationId xmlns:a16="http://schemas.microsoft.com/office/drawing/2014/main" id="{A0D6982A-54D6-1D87-AF16-9810A7A0BACE}"/>
+                </a:ext>
+              </a:extLst>
+            </p:cNvPr>
+            <p:cNvCxnSpPr/>
+            <p:nvPr/>
+          </p:nvCxnSpPr>
+          <p:spPr>
+            <a:xfrm>
+              <a:off x="5246663" y="3344192"/>
+              <a:ext cx="0" cy="1434581"/>
+            </a:xfrm>
+            <a:prstGeom prst="straightConnector1">
+              <a:avLst/>
+            </a:prstGeom>
+            <a:ln w="28575">
+              <a:tailEnd type="triangle"/>
+            </a:ln>
+          </p:spPr>
+          <p:style>
+            <a:lnRef idx="1">
+              <a:schemeClr val="accent1"/>
+            </a:lnRef>
+            <a:fillRef idx="0">
+              <a:schemeClr val="accent1"/>
+            </a:fillRef>
+            <a:effectRef idx="0">
+              <a:schemeClr val="accent1"/>
+            </a:effectRef>
+            <a:fontRef idx="minor">
+              <a:schemeClr val="tx1"/>
+            </a:fontRef>
+          </p:style>
+        </p:cxnSp>
+      </p:grpSp>
+      <p:grpSp>
+        <p:nvGrpSpPr>
+          <p:cNvPr id="12" name="Group 11">
+            <a:extLst>
+              <a:ext uri="{FF2B5EF4-FFF2-40B4-BE49-F238E27FC236}">
+                <a16:creationId xmlns:a16="http://schemas.microsoft.com/office/drawing/2014/main" id="{91880932-D0C4-47E5-F735-F668181E8045}"/>
+              </a:ext>
+            </a:extLst>
+          </p:cNvPr>
+          <p:cNvGrpSpPr/>
+          <p:nvPr/>
+        </p:nvGrpSpPr>
+        <p:grpSpPr>
+          <a:xfrm>
+            <a:off x="9473723" y="3041299"/>
+            <a:ext cx="2075379" cy="2999266"/>
+            <a:chOff x="6864087" y="3041299"/>
+            <a:chExt cx="2075379" cy="2999266"/>
+          </a:xfrm>
+        </p:grpSpPr>
+        <p:cxnSp>
+          <p:nvCxnSpPr>
+            <p:cNvPr id="30" name="Straight Connector 29">
+              <a:extLst>
+                <a:ext uri="{FF2B5EF4-FFF2-40B4-BE49-F238E27FC236}">
+                  <a16:creationId xmlns:a16="http://schemas.microsoft.com/office/drawing/2014/main" id="{B0CEBAE6-56FE-95F3-77C9-0C78FBB359B8}"/>
+                </a:ext>
+              </a:extLst>
+            </p:cNvPr>
+            <p:cNvCxnSpPr>
+              <a:cxnSpLocks/>
+            </p:cNvCxnSpPr>
+            <p:nvPr/>
+          </p:nvCxnSpPr>
+          <p:spPr>
+            <a:xfrm>
+              <a:off x="6864087" y="6040565"/>
               <a:ext cx="2075379" cy="0"/>
             </a:xfrm>
             <a:prstGeom prst="line">
@@ -7102,7 +7925,7 @@
             <p:cNvPr id="31" name="Straight Connector 30">
               <a:extLst>
                 <a:ext uri="{FF2B5EF4-FFF2-40B4-BE49-F238E27FC236}">
-                  <a16:creationId xmlns:a16="http://schemas.microsoft.com/office/drawing/2014/main" id="{9DFB1F3A-B48D-0E93-CBC0-7659B5A4EA7F}"/>
+                  <a16:creationId xmlns:a16="http://schemas.microsoft.com/office/drawing/2014/main" id="{6CE73A24-81F1-5927-B40F-E722DBE6FA23}"/>
                 </a:ext>
               </a:extLst>
             </p:cNvPr>
@@ -7113,7 +7936,7 @@
           </p:nvCxnSpPr>
           <p:spPr>
             <a:xfrm>
-              <a:off x="6923070" y="4606464"/>
+              <a:off x="6874361" y="4760576"/>
               <a:ext cx="2065105" cy="0"/>
             </a:xfrm>
             <a:prstGeom prst="line">
@@ -7138,33 +7961,60 @@
             </a:fontRef>
           </p:style>
         </p:cxnSp>
-      </p:grpSp>
-      <p:grpSp>
-        <p:nvGrpSpPr>
-          <p:cNvPr id="37" name="Group 36">
-            <a:extLst>
-              <a:ext uri="{FF2B5EF4-FFF2-40B4-BE49-F238E27FC236}">
-                <a16:creationId xmlns:a16="http://schemas.microsoft.com/office/drawing/2014/main" id="{3251F2D8-B34A-5021-D12A-2FD0C827B4B2}"/>
-              </a:ext>
-            </a:extLst>
-          </p:cNvPr>
-          <p:cNvGrpSpPr/>
-          <p:nvPr/>
-        </p:nvGrpSpPr>
-        <p:grpSpPr>
-          <a:xfrm>
-            <a:off x="4145239" y="4777162"/>
-            <a:ext cx="2075379" cy="519703"/>
-            <a:chOff x="4354531" y="4623050"/>
-            <a:chExt cx="2075379" cy="519703"/>
-          </a:xfrm>
-        </p:grpSpPr>
+        <p:sp>
+          <p:nvSpPr>
+            <p:cNvPr id="8" name="Oval 7">
+              <a:extLst>
+                <a:ext uri="{FF2B5EF4-FFF2-40B4-BE49-F238E27FC236}">
+                  <a16:creationId xmlns:a16="http://schemas.microsoft.com/office/drawing/2014/main" id="{4BEA1292-058C-0CEA-96C0-AAE27880F9F5}"/>
+                </a:ext>
+              </a:extLst>
+            </p:cNvPr>
+            <p:cNvSpPr/>
+            <p:nvPr/>
+          </p:nvSpPr>
+          <p:spPr>
+            <a:xfrm>
+              <a:off x="7431060" y="3041299"/>
+              <a:ext cx="1032553" cy="1032553"/>
+            </a:xfrm>
+            <a:prstGeom prst="ellipse">
+              <a:avLst/>
+            </a:prstGeom>
+            <a:noFill/>
+            <a:ln w="28575"/>
+          </p:spPr>
+          <p:style>
+            <a:lnRef idx="2">
+              <a:schemeClr val="accent1">
+                <a:shade val="50000"/>
+              </a:schemeClr>
+            </a:lnRef>
+            <a:fillRef idx="1">
+              <a:schemeClr val="accent1"/>
+            </a:fillRef>
+            <a:effectRef idx="0">
+              <a:schemeClr val="accent1"/>
+            </a:effectRef>
+            <a:fontRef idx="minor">
+              <a:schemeClr val="lt1"/>
+            </a:fontRef>
+          </p:style>
+          <p:txBody>
+            <a:bodyPr rtlCol="0" anchor="ctr"/>
+            <a:lstStyle/>
+            <a:p>
+              <a:pPr algn="ctr"/>
+              <a:endParaRPr lang="en-US"/>
+            </a:p>
+          </p:txBody>
+        </p:sp>
         <p:cxnSp>
           <p:nvCxnSpPr>
-            <p:cNvPr id="32" name="Straight Connector 31">
+            <p:cNvPr id="9" name="Straight Arrow Connector 8">
               <a:extLst>
                 <a:ext uri="{FF2B5EF4-FFF2-40B4-BE49-F238E27FC236}">
-                  <a16:creationId xmlns:a16="http://schemas.microsoft.com/office/drawing/2014/main" id="{C306F018-41FF-F28F-F061-6B8541780A35}"/>
+                  <a16:creationId xmlns:a16="http://schemas.microsoft.com/office/drawing/2014/main" id="{C65A7D7E-B1EC-A9FD-81EC-58C8126C5ACE}"/>
                 </a:ext>
               </a:extLst>
             </p:cNvPr>
@@ -7175,53 +8025,14 @@
           </p:nvCxnSpPr>
           <p:spPr>
             <a:xfrm>
-              <a:off x="4354531" y="5142753"/>
-              <a:ext cx="2075379" cy="0"/>
+              <a:off x="7947336" y="3557575"/>
+              <a:ext cx="0" cy="1569229"/>
             </a:xfrm>
-            <a:prstGeom prst="line">
-              <a:avLst/>
-            </a:prstGeom>
-            <a:ln w="28575"/>
-          </p:spPr>
-          <p:style>
-            <a:lnRef idx="1">
-              <a:schemeClr val="accent1"/>
-            </a:lnRef>
-            <a:fillRef idx="0">
-              <a:schemeClr val="accent1"/>
-            </a:fillRef>
-            <a:effectRef idx="0">
-              <a:schemeClr val="accent1"/>
-            </a:effectRef>
-            <a:fontRef idx="minor">
-              <a:schemeClr val="tx1"/>
-            </a:fontRef>
-          </p:style>
-        </p:cxnSp>
-        <p:cxnSp>
-          <p:nvCxnSpPr>
-            <p:cNvPr id="33" name="Straight Connector 32">
-              <a:extLst>
-                <a:ext uri="{FF2B5EF4-FFF2-40B4-BE49-F238E27FC236}">
-                  <a16:creationId xmlns:a16="http://schemas.microsoft.com/office/drawing/2014/main" id="{C10606F2-B4CF-5DAC-3CBA-8F7C95116678}"/>
-                </a:ext>
-              </a:extLst>
-            </p:cNvPr>
-            <p:cNvCxnSpPr>
-              <a:cxnSpLocks/>
-            </p:cNvCxnSpPr>
-            <p:nvPr/>
-          </p:nvCxnSpPr>
-          <p:spPr>
-            <a:xfrm>
-              <a:off x="4364805" y="4623050"/>
-              <a:ext cx="2065105" cy="0"/>
-            </a:xfrm>
-            <a:prstGeom prst="line">
+            <a:prstGeom prst="straightConnector1">
               <a:avLst/>
             </a:prstGeom>
             <a:ln w="28575">
-              <a:prstDash val="dash"/>
+              <a:tailEnd type="triangle"/>
             </a:ln>
           </p:spPr>
           <p:style>
@@ -7240,113 +8051,12 @@
           </p:style>
         </p:cxnSp>
       </p:grpSp>
-      <p:grpSp>
-        <p:nvGrpSpPr>
-          <p:cNvPr id="36" name="Group 35">
-            <a:extLst>
-              <a:ext uri="{FF2B5EF4-FFF2-40B4-BE49-F238E27FC236}">
-                <a16:creationId xmlns:a16="http://schemas.microsoft.com/office/drawing/2014/main" id="{6CAC6860-AED7-4343-7B6A-EEE7F33B4C7B}"/>
-              </a:ext>
-            </a:extLst>
-          </p:cNvPr>
-          <p:cNvGrpSpPr/>
-          <p:nvPr/>
-        </p:nvGrpSpPr>
-        <p:grpSpPr>
-          <a:xfrm>
-            <a:off x="1426391" y="4777162"/>
-            <a:ext cx="2075379" cy="519703"/>
-            <a:chOff x="1909281" y="4606464"/>
-            <a:chExt cx="2075379" cy="519703"/>
-          </a:xfrm>
-        </p:grpSpPr>
-        <p:cxnSp>
-          <p:nvCxnSpPr>
-            <p:cNvPr id="34" name="Straight Connector 33">
-              <a:extLst>
-                <a:ext uri="{FF2B5EF4-FFF2-40B4-BE49-F238E27FC236}">
-                  <a16:creationId xmlns:a16="http://schemas.microsoft.com/office/drawing/2014/main" id="{7F7CCF12-3AC2-2FEE-F697-3FC8A29BB714}"/>
-                </a:ext>
-              </a:extLst>
-            </p:cNvPr>
-            <p:cNvCxnSpPr>
-              <a:cxnSpLocks/>
-            </p:cNvCxnSpPr>
-            <p:nvPr/>
-          </p:nvCxnSpPr>
-          <p:spPr>
-            <a:xfrm>
-              <a:off x="1909281" y="5126167"/>
-              <a:ext cx="2075379" cy="0"/>
-            </a:xfrm>
-            <a:prstGeom prst="line">
-              <a:avLst/>
-            </a:prstGeom>
-            <a:ln w="28575"/>
-          </p:spPr>
-          <p:style>
-            <a:lnRef idx="1">
-              <a:schemeClr val="accent1"/>
-            </a:lnRef>
-            <a:fillRef idx="0">
-              <a:schemeClr val="accent1"/>
-            </a:fillRef>
-            <a:effectRef idx="0">
-              <a:schemeClr val="accent1"/>
-            </a:effectRef>
-            <a:fontRef idx="minor">
-              <a:schemeClr val="tx1"/>
-            </a:fontRef>
-          </p:style>
-        </p:cxnSp>
-        <p:cxnSp>
-          <p:nvCxnSpPr>
-            <p:cNvPr id="35" name="Straight Connector 34">
-              <a:extLst>
-                <a:ext uri="{FF2B5EF4-FFF2-40B4-BE49-F238E27FC236}">
-                  <a16:creationId xmlns:a16="http://schemas.microsoft.com/office/drawing/2014/main" id="{F2E66426-1CFD-359C-4D56-A893CE478591}"/>
-                </a:ext>
-              </a:extLst>
-            </p:cNvPr>
-            <p:cNvCxnSpPr>
-              <a:cxnSpLocks/>
-            </p:cNvCxnSpPr>
-            <p:nvPr/>
-          </p:nvCxnSpPr>
-          <p:spPr>
-            <a:xfrm>
-              <a:off x="1919555" y="4606464"/>
-              <a:ext cx="2065105" cy="0"/>
-            </a:xfrm>
-            <a:prstGeom prst="line">
-              <a:avLst/>
-            </a:prstGeom>
-            <a:ln w="28575">
-              <a:prstDash val="dash"/>
-            </a:ln>
-          </p:spPr>
-          <p:style>
-            <a:lnRef idx="1">
-              <a:schemeClr val="accent1"/>
-            </a:lnRef>
-            <a:fillRef idx="0">
-              <a:schemeClr val="accent1"/>
-            </a:fillRef>
-            <a:effectRef idx="0">
-              <a:schemeClr val="accent1"/>
-            </a:effectRef>
-            <a:fontRef idx="minor">
-              <a:schemeClr val="tx1"/>
-            </a:fontRef>
-          </p:style>
-        </p:cxnSp>
-      </p:grpSp>
-      <p:sp>
-        <p:nvSpPr>
-          <p:cNvPr id="3" name="TextBox 2">
-            <a:extLst>
-              <a:ext uri="{FF2B5EF4-FFF2-40B4-BE49-F238E27FC236}">
-                <a16:creationId xmlns:a16="http://schemas.microsoft.com/office/drawing/2014/main" id="{F3149844-FDC9-090D-C1EF-930B8607B214}"/>
+      <p:sp>
+        <p:nvSpPr>
+          <p:cNvPr id="11" name="TextBox 10">
+            <a:extLst>
+              <a:ext uri="{FF2B5EF4-FFF2-40B4-BE49-F238E27FC236}">
+                <a16:creationId xmlns:a16="http://schemas.microsoft.com/office/drawing/2014/main" id="{B5AAD760-63D4-DAC5-2CB2-941A80C85382}"/>
               </a:ext>
             </a:extLst>
           </p:cNvPr>
@@ -7355,8 +8065,8 @@
         </p:nvSpPr>
         <p:spPr>
           <a:xfrm>
-            <a:off x="9915895" y="0"/>
-            <a:ext cx="2376549" cy="1569660"/>
+            <a:off x="293236" y="2873562"/>
+            <a:ext cx="2075379" cy="369332"/>
           </a:xfrm>
           <a:prstGeom prst="rect">
             <a:avLst/>
@@ -7369,10 +8079,224 @@
           </a:bodyPr>
           <a:lstStyle/>
           <a:p>
+            <a:pPr algn="r"/>
+            <a:r>
+              <a:rPr lang="en-US" dirty="0"/>
+              <a:t>(BOT - 1) + SPEED</a:t>
+            </a:r>
+          </a:p>
+        </p:txBody>
+      </p:sp>
+      <p:sp>
+        <p:nvSpPr>
+          <p:cNvPr id="15" name="TextBox 14">
+            <a:extLst>
+              <a:ext uri="{FF2B5EF4-FFF2-40B4-BE49-F238E27FC236}">
+                <a16:creationId xmlns:a16="http://schemas.microsoft.com/office/drawing/2014/main" id="{157A5E1A-B900-2E48-211D-EE68140F1699}"/>
+              </a:ext>
+            </a:extLst>
+          </p:cNvPr>
+          <p:cNvSpPr txBox="1"/>
+          <p:nvPr/>
+        </p:nvSpPr>
+        <p:spPr>
+          <a:xfrm>
+            <a:off x="4503507" y="3159526"/>
+            <a:ext cx="2075379" cy="369332"/>
+          </a:xfrm>
+          <a:prstGeom prst="rect">
+            <a:avLst/>
+          </a:prstGeom>
+          <a:noFill/>
+        </p:spPr>
+        <p:txBody>
+          <a:bodyPr wrap="square" rtlCol="0">
+            <a:spAutoFit/>
+          </a:bodyPr>
+          <a:lstStyle/>
+          <a:p>
+            <a:r>
+              <a:rPr lang="en-US" dirty="0"/>
+              <a:t>(BOT     ) + SPEED</a:t>
+            </a:r>
+          </a:p>
+        </p:txBody>
+      </p:sp>
+      <p:sp>
+        <p:nvSpPr>
+          <p:cNvPr id="16" name="TextBox 15">
+            <a:extLst>
+              <a:ext uri="{FF2B5EF4-FFF2-40B4-BE49-F238E27FC236}">
+                <a16:creationId xmlns:a16="http://schemas.microsoft.com/office/drawing/2014/main" id="{8B8D5B4E-0D68-29D1-07CA-3CA4C492B010}"/>
+              </a:ext>
+            </a:extLst>
+          </p:cNvPr>
+          <p:cNvSpPr txBox="1"/>
+          <p:nvPr/>
+        </p:nvSpPr>
+        <p:spPr>
+          <a:xfrm>
+            <a:off x="8170331" y="3352926"/>
+            <a:ext cx="2075379" cy="369332"/>
+          </a:xfrm>
+          <a:prstGeom prst="rect">
+            <a:avLst/>
+          </a:prstGeom>
+          <a:noFill/>
+        </p:spPr>
+        <p:txBody>
+          <a:bodyPr wrap="square" rtlCol="0">
+            <a:spAutoFit/>
+          </a:bodyPr>
+          <a:lstStyle/>
+          <a:p>
+            <a:r>
+              <a:rPr lang="en-US" dirty="0"/>
+              <a:t>(BOT + 1) + SPEED</a:t>
+            </a:r>
+          </a:p>
+        </p:txBody>
+      </p:sp>
+      <p:sp>
+        <p:nvSpPr>
+          <p:cNvPr id="17" name="TextBox 16">
+            <a:extLst>
+              <a:ext uri="{FF2B5EF4-FFF2-40B4-BE49-F238E27FC236}">
+                <a16:creationId xmlns:a16="http://schemas.microsoft.com/office/drawing/2014/main" id="{DBFAF4AE-B6DE-C94B-53C9-85E1F61868A8}"/>
+              </a:ext>
+            </a:extLst>
+          </p:cNvPr>
+          <p:cNvSpPr txBox="1"/>
+          <p:nvPr/>
+        </p:nvSpPr>
+        <p:spPr>
+          <a:xfrm>
+            <a:off x="2657914" y="400643"/>
+            <a:ext cx="7389494" cy="584775"/>
+          </a:xfrm>
+          <a:prstGeom prst="rect">
+            <a:avLst/>
+          </a:prstGeom>
+          <a:noFill/>
+        </p:spPr>
+        <p:txBody>
+          <a:bodyPr wrap="square" rtlCol="0">
+            <a:spAutoFit/>
+          </a:bodyPr>
+          <a:lstStyle/>
+          <a:p>
             <a:pPr algn="ctr"/>
             <a:r>
-              <a:rPr lang="en-US" sz="4800" dirty="0"/>
-              <a:t>tock analysis</a:t>
+              <a:rPr lang="en-US" sz="3200" dirty="0"/>
+              <a:t>boundary case analysis for tock</a:t>
+            </a:r>
+          </a:p>
+        </p:txBody>
+      </p:sp>
+      <p:sp>
+        <p:nvSpPr>
+          <p:cNvPr id="19" name="TextBox 18">
+            <a:extLst>
+              <a:ext uri="{FF2B5EF4-FFF2-40B4-BE49-F238E27FC236}">
+                <a16:creationId xmlns:a16="http://schemas.microsoft.com/office/drawing/2014/main" id="{16042153-4771-3D05-7CFD-CEF8133F8B62}"/>
+              </a:ext>
+            </a:extLst>
+          </p:cNvPr>
+          <p:cNvSpPr txBox="1"/>
+          <p:nvPr/>
+        </p:nvSpPr>
+        <p:spPr>
+          <a:xfrm>
+            <a:off x="2138356" y="6174944"/>
+            <a:ext cx="1921268" cy="369332"/>
+          </a:xfrm>
+          <a:prstGeom prst="rect">
+            <a:avLst/>
+          </a:prstGeom>
+          <a:noFill/>
+        </p:spPr>
+        <p:txBody>
+          <a:bodyPr wrap="square" rtlCol="0">
+            <a:spAutoFit/>
+          </a:bodyPr>
+          <a:lstStyle/>
+          <a:p>
+            <a:pPr algn="ctr"/>
+            <a:r>
+              <a:rPr lang="en-US" dirty="0"/>
+              <a:t>result is BOT - 1</a:t>
+            </a:r>
+          </a:p>
+        </p:txBody>
+      </p:sp>
+      <p:sp>
+        <p:nvSpPr>
+          <p:cNvPr id="21" name="TextBox 20">
+            <a:extLst>
+              <a:ext uri="{FF2B5EF4-FFF2-40B4-BE49-F238E27FC236}">
+                <a16:creationId xmlns:a16="http://schemas.microsoft.com/office/drawing/2014/main" id="{19CB62E6-C195-DE3A-D30D-B08C57554E35}"/>
+              </a:ext>
+            </a:extLst>
+          </p:cNvPr>
+          <p:cNvSpPr txBox="1"/>
+          <p:nvPr/>
+        </p:nvSpPr>
+        <p:spPr>
+          <a:xfrm>
+            <a:off x="5844568" y="6174944"/>
+            <a:ext cx="1921268" cy="369332"/>
+          </a:xfrm>
+          <a:prstGeom prst="rect">
+            <a:avLst/>
+          </a:prstGeom>
+          <a:noFill/>
+        </p:spPr>
+        <p:txBody>
+          <a:bodyPr wrap="square" rtlCol="0">
+            <a:spAutoFit/>
+          </a:bodyPr>
+          <a:lstStyle/>
+          <a:p>
+            <a:pPr algn="ctr"/>
+            <a:r>
+              <a:rPr lang="en-US" dirty="0"/>
+              <a:t>result is BOT</a:t>
+            </a:r>
+          </a:p>
+        </p:txBody>
+      </p:sp>
+      <p:sp>
+        <p:nvSpPr>
+          <p:cNvPr id="22" name="TextBox 21">
+            <a:extLst>
+              <a:ext uri="{FF2B5EF4-FFF2-40B4-BE49-F238E27FC236}">
+                <a16:creationId xmlns:a16="http://schemas.microsoft.com/office/drawing/2014/main" id="{F7CD7ADE-D10B-D98F-207C-201027AB87B5}"/>
+              </a:ext>
+            </a:extLst>
+          </p:cNvPr>
+          <p:cNvSpPr txBox="1"/>
+          <p:nvPr/>
+        </p:nvSpPr>
+        <p:spPr>
+          <a:xfrm>
+            <a:off x="9595106" y="6174944"/>
+            <a:ext cx="1921268" cy="369332"/>
+          </a:xfrm>
+          <a:prstGeom prst="rect">
+            <a:avLst/>
+          </a:prstGeom>
+          <a:noFill/>
+        </p:spPr>
+        <p:txBody>
+          <a:bodyPr wrap="square" rtlCol="0">
+            <a:spAutoFit/>
+          </a:bodyPr>
+          <a:lstStyle/>
+          <a:p>
+            <a:pPr algn="ctr"/>
+            <a:r>
+              <a:rPr lang="en-US" dirty="0"/>
+              <a:t>result is BOT</a:t>
             </a:r>
           </a:p>
         </p:txBody>
@@ -7380,7 +8304,7 @@
     </p:spTree>
     <p:extLst>
       <p:ext uri="{BB962C8B-B14F-4D97-AF65-F5344CB8AC3E}">
-        <p14:creationId xmlns:p14="http://schemas.microsoft.com/office/powerpoint/2010/main" val="1635311286"/>
+        <p14:creationId xmlns:p14="http://schemas.microsoft.com/office/powerpoint/2010/main" val="342371309"/>
       </p:ext>
     </p:extLst>
   </p:cSld>
@@ -7390,7 +8314,7 @@
 </p:sld>
 </file>
 
-<file path=ppt/slides/slide17.xml><?xml version="1.0" encoding="utf-8"?>
+<file path=ppt/slides/slide18.xml><?xml version="1.0" encoding="utf-8"?>
 <p:sld xmlns:a="http://schemas.openxmlformats.org/drawingml/2006/main" xmlns:r="http://schemas.openxmlformats.org/officeDocument/2006/relationships" xmlns:p="http://schemas.openxmlformats.org/presentationml/2006/main">
   <p:cSld>
     <p:spTree>
@@ -7470,7 +8394,7 @@
 </p:sld>
 </file>
 
-<file path=ppt/slides/slide18.xml><?xml version="1.0" encoding="utf-8"?>
+<file path=ppt/slides/slide19.xml><?xml version="1.0" encoding="utf-8"?>
 <p:sld xmlns:a="http://schemas.openxmlformats.org/drawingml/2006/main" xmlns:r="http://schemas.openxmlformats.org/officeDocument/2006/relationships" xmlns:p="http://schemas.openxmlformats.org/presentationml/2006/main">
   <p:cSld>
     <p:spTree>

</xml_diff>